<commit_message>
updated bio to include ITUnity
</commit_message>
<xml_diff>
--- a/presentation.pptx
+++ b/presentation.pptx
@@ -5,15 +5,17 @@
     <p:sldMasterId id="2147483660" r:id="rId1"/>
   </p:sldMasterIdLst>
   <p:notesMasterIdLst>
-    <p:notesMasterId r:id="rId5"/>
+    <p:notesMasterId r:id="rId7"/>
   </p:notesMasterIdLst>
   <p:handoutMasterIdLst>
-    <p:handoutMasterId r:id="rId6"/>
+    <p:handoutMasterId r:id="rId8"/>
   </p:handoutMasterIdLst>
   <p:sldIdLst>
     <p:sldId id="256" r:id="rId2"/>
     <p:sldId id="264" r:id="rId3"/>
-    <p:sldId id="263" r:id="rId4"/>
+    <p:sldId id="265" r:id="rId4"/>
+    <p:sldId id="266" r:id="rId5"/>
+    <p:sldId id="263" r:id="rId6"/>
   </p:sldIdLst>
   <p:sldSz cx="12192000" cy="6858000"/>
   <p:notesSz cx="6858000" cy="9144000"/>
@@ -119,16 +121,18 @@
           <p14:sldIdLst>
             <p14:sldId id="256"/>
             <p14:sldId id="264"/>
+            <p14:sldId id="265"/>
+            <p14:sldId id="266"/>
             <p14:sldId id="263"/>
           </p14:sldIdLst>
         </p14:section>
       </p14:sectionLst>
     </p:ext>
     <p:ext uri="{EFAFB233-063F-42B5-8137-9DF3F51BA10A}">
-      <p15:sldGuideLst xmlns="" xmlns:p15="http://schemas.microsoft.com/office/powerpoint/2012/main"/>
+      <p15:sldGuideLst xmlns:p15="http://schemas.microsoft.com/office/powerpoint/2012/main" xmlns=""/>
     </p:ext>
     <p:ext uri="{2D200454-40CA-4A62-9FC3-DE9A4176ACB9}">
-      <p15:notesGuideLst xmlns="" xmlns:p15="http://schemas.microsoft.com/office/powerpoint/2012/main"/>
+      <p15:notesGuideLst xmlns:p15="http://schemas.microsoft.com/office/powerpoint/2012/main" xmlns=""/>
     </p:ext>
   </p:extLst>
 </p:presentation>
@@ -216,7 +220,7 @@
           <a:p>
             <a:fld id="{1B94432C-314F-49E0-BCF5-1DF451204E4D}" type="datetimeFigureOut">
               <a:rPr lang="en-US" smtClean="0"/>
-              <a:t>9/1/14</a:t>
+              <a:t>9/2/14</a:t>
             </a:fld>
             <a:endParaRPr lang="en-US"/>
           </a:p>
@@ -381,7 +385,7 @@
           <a:p>
             <a:fld id="{4919CEFB-A65A-48DF-BB74-7C5EA2C86EF7}" type="datetimeFigureOut">
               <a:rPr lang="en-US" smtClean="0"/>
-              <a:t>9/1/14</a:t>
+              <a:t>9/2/14</a:t>
             </a:fld>
             <a:endParaRPr lang="en-US"/>
           </a:p>
@@ -3640,7 +3644,7 @@
   </p:clrMapOvr>
   <p:extLst mod="1">
     <p:ext uri="{DCECCB84-F9BA-43D5-87BE-67443E8EF086}">
-      <p15:sldGuideLst xmlns="" xmlns:p15="http://schemas.microsoft.com/office/powerpoint/2012/main">
+      <p15:sldGuideLst xmlns:p15="http://schemas.microsoft.com/office/powerpoint/2012/main" xmlns="">
         <p15:guide id="1" orient="horz" pos="2160" userDrawn="1">
           <p15:clr>
             <a:srgbClr val="FBAE40"/>
@@ -4738,7 +4742,7 @@
   </p:txStyles>
   <p:extLst mod="1">
     <p:ext uri="{27BBF7A9-308A-43DC-89C8-2F10F3537804}">
-      <p15:sldGuideLst xmlns="" xmlns:p15="http://schemas.microsoft.com/office/powerpoint/2012/main">
+      <p15:sldGuideLst xmlns:p15="http://schemas.microsoft.com/office/powerpoint/2012/main" xmlns="">
         <p15:guide id="1" orient="horz" pos="2160" userDrawn="1">
           <p15:clr>
             <a:srgbClr val="F26B43"/>
@@ -4910,13 +4914,7 @@
               <a:rPr lang="en-US" dirty="0">
                 <a:hlinkClick r:id="rId2"/>
               </a:rPr>
-              <a:t>https://github.com/andrewconnell</a:t>
-            </a:r>
-            <a:r>
-              <a:rPr lang="en-US" dirty="0">
-                <a:hlinkClick r:id="rId2"/>
-              </a:rPr>
-              <a:t>/pres-spa-ng-</a:t>
+              <a:t>https://github.com/andrewconnell/pres-spa-ng-</a:t>
             </a:r>
             <a:r>
               <a:rPr lang="en-US" dirty="0" smtClean="0">
@@ -5810,6 +5808,330 @@
 </file>
 
 <file path=ppt/slides/slide3.xml><?xml version="1.0" encoding="utf-8"?>
+<p:sld xmlns:a="http://schemas.openxmlformats.org/drawingml/2006/main" xmlns:r="http://schemas.openxmlformats.org/officeDocument/2006/relationships" xmlns:p="http://schemas.openxmlformats.org/presentationml/2006/main">
+  <p:cSld>
+    <p:spTree>
+      <p:nvGrpSpPr>
+        <p:cNvPr id="1" name=""/>
+        <p:cNvGrpSpPr/>
+        <p:nvPr/>
+      </p:nvGrpSpPr>
+      <p:grpSpPr>
+        <a:xfrm>
+          <a:off x="0" y="0"/>
+          <a:ext cx="0" cy="0"/>
+          <a:chOff x="0" y="0"/>
+          <a:chExt cx="0" cy="0"/>
+        </a:xfrm>
+      </p:grpSpPr>
+      <p:sp>
+        <p:nvSpPr>
+          <p:cNvPr id="2" name="Title 1"/>
+          <p:cNvSpPr>
+            <a:spLocks noGrp="1"/>
+          </p:cNvSpPr>
+          <p:nvPr>
+            <p:ph type="title"/>
+          </p:nvPr>
+        </p:nvSpPr>
+        <p:spPr/>
+        <p:txBody>
+          <a:bodyPr/>
+          <a:lstStyle/>
+          <a:p>
+            <a:r>
+              <a:rPr lang="en-US" dirty="0" smtClean="0"/>
+              <a:t>Podcast: Microsoft Cloud Show</a:t>
+            </a:r>
+            <a:endParaRPr lang="en-US" dirty="0"/>
+          </a:p>
+        </p:txBody>
+      </p:sp>
+      <p:sp>
+        <p:nvSpPr>
+          <p:cNvPr id="3" name="Content Placeholder 2"/>
+          <p:cNvSpPr>
+            <a:spLocks noGrp="1"/>
+          </p:cNvSpPr>
+          <p:nvPr>
+            <p:ph idx="1"/>
+          </p:nvPr>
+        </p:nvSpPr>
+        <p:spPr/>
+        <p:txBody>
+          <a:bodyPr/>
+          <a:lstStyle/>
+          <a:p>
+            <a:r>
+              <a:rPr lang="en-US" dirty="0" smtClean="0"/>
+              <a:t>Focus on Microsoft’s cloud offerings &amp; competitive landscape</a:t>
+            </a:r>
+          </a:p>
+          <a:p>
+            <a:pPr lvl="1"/>
+            <a:r>
+              <a:rPr lang="en-US" dirty="0" smtClean="0"/>
+              <a:t>Microsoft Azure</a:t>
+            </a:r>
+          </a:p>
+          <a:p>
+            <a:pPr lvl="1"/>
+            <a:r>
+              <a:rPr lang="en-US" dirty="0" smtClean="0"/>
+              <a:t>Office 365 &amp; SharePoint</a:t>
+            </a:r>
+          </a:p>
+          <a:p>
+            <a:pPr lvl="1"/>
+            <a:r>
+              <a:rPr lang="en-US" dirty="0" smtClean="0"/>
+              <a:t>Amazon Web Services</a:t>
+            </a:r>
+          </a:p>
+          <a:p>
+            <a:pPr lvl="1"/>
+            <a:r>
+              <a:rPr lang="en-US" dirty="0" smtClean="0"/>
+              <a:t>Google Cloud</a:t>
+            </a:r>
+          </a:p>
+          <a:p>
+            <a:r>
+              <a:rPr lang="en-US" dirty="0" err="1" smtClean="0">
+                <a:hlinkClick r:id="rId2"/>
+              </a:rPr>
+              <a:t>www.MicrosoftCloudShow.com</a:t>
+            </a:r>
+            <a:r>
+              <a:rPr lang="en-US" dirty="0" smtClean="0"/>
+              <a:t> | </a:t>
+            </a:r>
+            <a:r>
+              <a:rPr lang="en-US" dirty="0" smtClean="0">
+                <a:hlinkClick r:id="rId3"/>
+              </a:rPr>
+              <a:t>@mscloudshow</a:t>
+            </a:r>
+            <a:endParaRPr lang="en-US" dirty="0" smtClean="0"/>
+          </a:p>
+          <a:p>
+            <a:r>
+              <a:rPr lang="en-US" dirty="0" smtClean="0"/>
+              <a:t>Search for “Microsoft Cloud Show” in iTunes, in the Windows Marketplaces or </a:t>
+            </a:r>
+            <a:r>
+              <a:rPr lang="en-US" dirty="0" err="1" smtClean="0"/>
+              <a:t>Stitcher</a:t>
+            </a:r>
+            <a:endParaRPr lang="en-US" dirty="0"/>
+          </a:p>
+        </p:txBody>
+      </p:sp>
+      <p:pic>
+        <p:nvPicPr>
+          <p:cNvPr id="6" name="Picture 5" descr="FA_Microsoft-Cloud-Show_Logo.png"/>
+          <p:cNvPicPr>
+            <a:picLocks noChangeAspect="1"/>
+          </p:cNvPicPr>
+          <p:nvPr/>
+        </p:nvPicPr>
+        <p:blipFill>
+          <a:blip r:embed="rId4">
+            <a:extLst>
+              <a:ext uri="{28A0092B-C50C-407E-A947-70E740481C1C}">
+                <a14:useLocalDpi xmlns:a14="http://schemas.microsoft.com/office/drawing/2010/main" val="0"/>
+              </a:ext>
+            </a:extLst>
+          </a:blip>
+          <a:stretch>
+            <a:fillRect/>
+          </a:stretch>
+        </p:blipFill>
+        <p:spPr>
+          <a:xfrm>
+            <a:off x="8916393" y="2215810"/>
+            <a:ext cx="2616382" cy="2160851"/>
+          </a:xfrm>
+          <a:prstGeom prst="rect">
+            <a:avLst/>
+          </a:prstGeom>
+        </p:spPr>
+      </p:pic>
+    </p:spTree>
+    <p:extLst>
+      <p:ext uri="{BB962C8B-B14F-4D97-AF65-F5344CB8AC3E}">
+        <p14:creationId xmlns:p14="http://schemas.microsoft.com/office/powerpoint/2010/main" val="3919420170"/>
+      </p:ext>
+    </p:extLst>
+  </p:cSld>
+  <p:clrMapOvr>
+    <a:masterClrMapping/>
+  </p:clrMapOvr>
+  <p:timing>
+    <p:tnLst>
+      <p:par>
+        <p:cTn xmlns:p14="http://schemas.microsoft.com/office/powerpoint/2010/main" id="1" dur="indefinite" restart="never" nodeType="tmRoot"/>
+      </p:par>
+    </p:tnLst>
+  </p:timing>
+</p:sld>
+</file>
+
+<file path=ppt/slides/slide4.xml><?xml version="1.0" encoding="utf-8"?>
+<p:sld xmlns:a="http://schemas.openxmlformats.org/drawingml/2006/main" xmlns:r="http://schemas.openxmlformats.org/officeDocument/2006/relationships" xmlns:p="http://schemas.openxmlformats.org/presentationml/2006/main">
+  <p:cSld>
+    <p:spTree>
+      <p:nvGrpSpPr>
+        <p:cNvPr id="1" name=""/>
+        <p:cNvGrpSpPr/>
+        <p:nvPr/>
+      </p:nvGrpSpPr>
+      <p:grpSpPr>
+        <a:xfrm>
+          <a:off x="0" y="0"/>
+          <a:ext cx="0" cy="0"/>
+          <a:chOff x="0" y="0"/>
+          <a:chExt cx="0" cy="0"/>
+        </a:xfrm>
+      </p:grpSpPr>
+      <p:sp>
+        <p:nvSpPr>
+          <p:cNvPr id="2" name="Title 1"/>
+          <p:cNvSpPr>
+            <a:spLocks noGrp="1"/>
+          </p:cNvSpPr>
+          <p:nvPr>
+            <p:ph type="title"/>
+          </p:nvPr>
+        </p:nvSpPr>
+        <p:spPr/>
+        <p:txBody>
+          <a:bodyPr/>
+          <a:lstStyle/>
+          <a:p>
+            <a:r>
+              <a:rPr lang="en-US" smtClean="0"/>
+              <a:t>IT Unity</a:t>
+            </a:r>
+            <a:endParaRPr lang="en-US" dirty="0"/>
+          </a:p>
+        </p:txBody>
+      </p:sp>
+      <p:sp>
+        <p:nvSpPr>
+          <p:cNvPr id="5" name="Content Placeholder 4"/>
+          <p:cNvSpPr>
+            <a:spLocks noGrp="1"/>
+          </p:cNvSpPr>
+          <p:nvPr>
+            <p:ph idx="1"/>
+          </p:nvPr>
+        </p:nvSpPr>
+        <p:spPr/>
+        <p:txBody>
+          <a:bodyPr/>
+          <a:lstStyle/>
+          <a:p>
+            <a:r>
+              <a:rPr lang="en-US" dirty="0" smtClean="0"/>
+              <a:t>ONE stop resource for SharePoint &amp; Office 365</a:t>
+            </a:r>
+          </a:p>
+          <a:p>
+            <a:r>
+              <a:rPr lang="en-US" dirty="0" smtClean="0"/>
+              <a:t>Learn, grow, solve problems &amp; interact with peers</a:t>
+            </a:r>
+          </a:p>
+          <a:p>
+            <a:r>
+              <a:rPr lang="en-US" dirty="0" smtClean="0"/>
+              <a:t>Trusted content, news &amp; information by subject matter experts</a:t>
+            </a:r>
+          </a:p>
+          <a:p>
+            <a:r>
+              <a:rPr lang="en-US" dirty="0" smtClean="0"/>
+              <a:t>For business decision maters, IT pros, developers, platform owners &amp; end users</a:t>
+            </a:r>
+          </a:p>
+          <a:p>
+            <a:endParaRPr lang="en-US" dirty="0" smtClean="0">
+              <a:hlinkClick r:id="rId2"/>
+            </a:endParaRPr>
+          </a:p>
+          <a:p>
+            <a:r>
+              <a:rPr lang="en-US" dirty="0" smtClean="0">
+                <a:hlinkClick r:id="rId2"/>
+              </a:rPr>
+              <a:t>www.itunity.com</a:t>
+            </a:r>
+            <a:r>
+              <a:rPr lang="en-US" dirty="0" smtClean="0"/>
+              <a:t> | </a:t>
+            </a:r>
+            <a:r>
+              <a:rPr lang="en-US" dirty="0" smtClean="0">
+                <a:hlinkClick r:id="rId3"/>
+              </a:rPr>
+              <a:t>@itunity01</a:t>
+            </a:r>
+            <a:endParaRPr lang="en-US" dirty="0"/>
+          </a:p>
+        </p:txBody>
+      </p:sp>
+      <p:pic>
+        <p:nvPicPr>
+          <p:cNvPr id="6" name="Picture 5" descr="IT Unity Logo.jpg"/>
+          <p:cNvPicPr>
+            <a:picLocks noChangeAspect="1"/>
+          </p:cNvPicPr>
+          <p:nvPr/>
+        </p:nvPicPr>
+        <p:blipFill>
+          <a:blip r:embed="rId4" cstate="print">
+            <a:extLst>
+              <a:ext uri="{28A0092B-C50C-407E-A947-70E740481C1C}">
+                <a14:useLocalDpi xmlns:a14="http://schemas.microsoft.com/office/drawing/2010/main" val="0"/>
+              </a:ext>
+            </a:extLst>
+          </a:blip>
+          <a:stretch>
+            <a:fillRect/>
+          </a:stretch>
+        </p:blipFill>
+        <p:spPr>
+          <a:xfrm>
+            <a:off x="8560724" y="4074334"/>
+            <a:ext cx="2834639" cy="1594484"/>
+          </a:xfrm>
+          <a:prstGeom prst="rect">
+            <a:avLst/>
+          </a:prstGeom>
+        </p:spPr>
+      </p:pic>
+    </p:spTree>
+    <p:extLst>
+      <p:ext uri="{BB962C8B-B14F-4D97-AF65-F5344CB8AC3E}">
+        <p14:creationId xmlns:p14="http://schemas.microsoft.com/office/powerpoint/2010/main" val="3832465694"/>
+      </p:ext>
+    </p:extLst>
+  </p:cSld>
+  <p:clrMapOvr>
+    <a:masterClrMapping/>
+  </p:clrMapOvr>
+  <p:timing>
+    <p:tnLst>
+      <p:par>
+        <p:cTn xmlns:p14="http://schemas.microsoft.com/office/powerpoint/2010/main" id="1" dur="indefinite" restart="never" nodeType="tmRoot"/>
+      </p:par>
+    </p:tnLst>
+  </p:timing>
+</p:sld>
+</file>
+
+<file path=ppt/slides/slide5.xml><?xml version="1.0" encoding="utf-8"?>
 <p:sld xmlns:a="http://schemas.openxmlformats.org/drawingml/2006/main" xmlns:r="http://schemas.openxmlformats.org/officeDocument/2006/relationships" xmlns:p="http://schemas.openxmlformats.org/presentationml/2006/main">
   <p:cSld>
     <p:spTree>
@@ -6641,7 +6963,7 @@
   <a:extraClrSchemeLst/>
   <a:extLst>
     <a:ext uri="{05A4C25C-085E-4340-85A3-A5531E510DB2}">
-      <thm15:themeFamily xmlns="" xmlns:thm15="http://schemas.microsoft.com/office/thememl/2012/main" name="ACI Presentation.potx" id="{26D72829-1597-462E-9B47-74AA5085C4D6}" vid="{EEE73FA6-A194-4309-B012-C868B543F1BC}"/>
+      <thm15:themeFamily xmlns:thm15="http://schemas.microsoft.com/office/thememl/2012/main" xmlns="" name="ACI Presentation.potx" id="{26D72829-1597-462E-9B47-74AA5085C4D6}" vid="{EEE73FA6-A194-4309-B012-C868B543F1BC}"/>
     </a:ext>
   </a:extLst>
 </a:theme>
@@ -6902,7 +7224,7 @@
   <a:extraClrSchemeLst/>
   <a:extLst>
     <a:ext uri="{05A4C25C-085E-4340-85A3-A5531E510DB2}">
-      <thm15:themeFamily xmlns="" xmlns:thm15="http://schemas.microsoft.com/office/thememl/2012/main" name="Office Theme" id="{62F939B6-93AF-4DB8-9C6B-D6C7DFDC589F}" vid="{4A3C46E8-61CC-4603-A589-7422A47A8E4A}"/>
+      <thm15:themeFamily xmlns:thm15="http://schemas.microsoft.com/office/thememl/2012/main" xmlns="" name="Office Theme" id="{62F939B6-93AF-4DB8-9C6B-D6C7DFDC589F}" vid="{4A3C46E8-61CC-4603-A589-7422A47A8E4A}"/>
     </a:ext>
   </a:extLst>
 </a:theme>
@@ -7163,7 +7485,7 @@
   <a:extraClrSchemeLst/>
   <a:extLst>
     <a:ext uri="{05A4C25C-085E-4340-85A3-A5531E510DB2}">
-      <thm15:themeFamily xmlns="" xmlns:thm15="http://schemas.microsoft.com/office/thememl/2012/main" name="Office Theme" id="{62F939B6-93AF-4DB8-9C6B-D6C7DFDC589F}" vid="{4A3C46E8-61CC-4603-A589-7422A47A8E4A}"/>
+      <thm15:themeFamily xmlns:thm15="http://schemas.microsoft.com/office/thememl/2012/main" xmlns="" name="Office Theme" id="{62F939B6-93AF-4DB8-9C6B-D6C7DFDC589F}" vid="{4A3C46E8-61CC-4603-A589-7422A47A8E4A}"/>
     </a:ext>
   </a:extLst>
 </a:theme>

</xml_diff>

<commit_message>
updated repo name for consistency
</commit_message>
<xml_diff>
--- a/presentation.pptx
+++ b/presentation.pptx
@@ -129,10 +129,10 @@
       </p14:sectionLst>
     </p:ext>
     <p:ext uri="{EFAFB233-063F-42B5-8137-9DF3F51BA10A}">
-      <p15:sldGuideLst xmlns:p15="http://schemas.microsoft.com/office/powerpoint/2012/main" xmlns=""/>
+      <p15:sldGuideLst xmlns="" xmlns:p15="http://schemas.microsoft.com/office/powerpoint/2012/main"/>
     </p:ext>
     <p:ext uri="{2D200454-40CA-4A62-9FC3-DE9A4176ACB9}">
-      <p15:notesGuideLst xmlns:p15="http://schemas.microsoft.com/office/powerpoint/2012/main" xmlns=""/>
+      <p15:notesGuideLst xmlns="" xmlns:p15="http://schemas.microsoft.com/office/powerpoint/2012/main"/>
     </p:ext>
   </p:extLst>
 </p:presentation>
@@ -220,7 +220,7 @@
           <a:p>
             <a:fld id="{1B94432C-314F-49E0-BCF5-1DF451204E4D}" type="datetimeFigureOut">
               <a:rPr lang="en-US" smtClean="0"/>
-              <a:t>9/2/14</a:t>
+              <a:t>9/13/14</a:t>
             </a:fld>
             <a:endParaRPr lang="en-US"/>
           </a:p>
@@ -385,7 +385,7 @@
           <a:p>
             <a:fld id="{4919CEFB-A65A-48DF-BB74-7C5EA2C86EF7}" type="datetimeFigureOut">
               <a:rPr lang="en-US" smtClean="0"/>
-              <a:t>9/2/14</a:t>
+              <a:t>9/13/14</a:t>
             </a:fld>
             <a:endParaRPr lang="en-US"/>
           </a:p>
@@ -3644,7 +3644,7 @@
   </p:clrMapOvr>
   <p:extLst mod="1">
     <p:ext uri="{DCECCB84-F9BA-43D5-87BE-67443E8EF086}">
-      <p15:sldGuideLst xmlns:p15="http://schemas.microsoft.com/office/powerpoint/2012/main" xmlns="">
+      <p15:sldGuideLst xmlns="" xmlns:p15="http://schemas.microsoft.com/office/powerpoint/2012/main">
         <p15:guide id="1" orient="horz" pos="2160" userDrawn="1">
           <p15:clr>
             <a:srgbClr val="FBAE40"/>
@@ -4742,7 +4742,7 @@
   </p:txStyles>
   <p:extLst mod="1">
     <p:ext uri="{27BBF7A9-308A-43DC-89C8-2F10F3537804}">
-      <p15:sldGuideLst xmlns:p15="http://schemas.microsoft.com/office/powerpoint/2012/main" xmlns="">
+      <p15:sldGuideLst xmlns="" xmlns:p15="http://schemas.microsoft.com/office/powerpoint/2012/main">
         <p15:guide id="1" orient="horz" pos="2160" userDrawn="1">
           <p15:clr>
             <a:srgbClr val="F26B43"/>
@@ -4914,17 +4914,25 @@
               <a:rPr lang="en-US" dirty="0">
                 <a:hlinkClick r:id="rId2"/>
               </a:rPr>
-              <a:t>https://github.com/andrewconnell/pres-spa-ng-</a:t>
+              <a:t>https://</a:t>
             </a:r>
             <a:r>
               <a:rPr lang="en-US" dirty="0" smtClean="0">
                 <a:hlinkClick r:id="rId2"/>
               </a:rPr>
-              <a:t>spapps</a:t>
-            </a:r>
-            <a:r>
-              <a:rPr lang="en-US" dirty="0" smtClean="0"/>
-              <a:t> </a:t>
+              <a:t>github.com / andrewconnell</a:t>
+            </a:r>
+            <a:r>
+              <a:rPr lang="en-US" dirty="0">
+                <a:hlinkClick r:id="rId2"/>
+              </a:rPr>
+              <a:t> / pres-sp15app-ng-</a:t>
+            </a:r>
+            <a:r>
+              <a:rPr lang="en-US" dirty="0" smtClean="0">
+                <a:hlinkClick r:id="rId2"/>
+              </a:rPr>
+              <a:t>spa</a:t>
             </a:r>
             <a:endParaRPr lang="en-US" dirty="0"/>
           </a:p>
@@ -6963,7 +6971,7 @@
   <a:extraClrSchemeLst/>
   <a:extLst>
     <a:ext uri="{05A4C25C-085E-4340-85A3-A5531E510DB2}">
-      <thm15:themeFamily xmlns:thm15="http://schemas.microsoft.com/office/thememl/2012/main" xmlns="" name="ACI Presentation.potx" id="{26D72829-1597-462E-9B47-74AA5085C4D6}" vid="{EEE73FA6-A194-4309-B012-C868B543F1BC}"/>
+      <thm15:themeFamily xmlns="" xmlns:thm15="http://schemas.microsoft.com/office/thememl/2012/main" name="ACI Presentation.potx" id="{26D72829-1597-462E-9B47-74AA5085C4D6}" vid="{EEE73FA6-A194-4309-B012-C868B543F1BC}"/>
     </a:ext>
   </a:extLst>
 </a:theme>
@@ -7224,7 +7232,7 @@
   <a:extraClrSchemeLst/>
   <a:extLst>
     <a:ext uri="{05A4C25C-085E-4340-85A3-A5531E510DB2}">
-      <thm15:themeFamily xmlns:thm15="http://schemas.microsoft.com/office/thememl/2012/main" xmlns="" name="Office Theme" id="{62F939B6-93AF-4DB8-9C6B-D6C7DFDC589F}" vid="{4A3C46E8-61CC-4603-A589-7422A47A8E4A}"/>
+      <thm15:themeFamily xmlns="" xmlns:thm15="http://schemas.microsoft.com/office/thememl/2012/main" name="Office Theme" id="{62F939B6-93AF-4DB8-9C6B-D6C7DFDC589F}" vid="{4A3C46E8-61CC-4603-A589-7422A47A8E4A}"/>
     </a:ext>
   </a:extLst>
 </a:theme>
@@ -7485,7 +7493,7 @@
   <a:extraClrSchemeLst/>
   <a:extLst>
     <a:ext uri="{05A4C25C-085E-4340-85A3-A5531E510DB2}">
-      <thm15:themeFamily xmlns:thm15="http://schemas.microsoft.com/office/thememl/2012/main" xmlns="" name="Office Theme" id="{62F939B6-93AF-4DB8-9C6B-D6C7DFDC589F}" vid="{4A3C46E8-61CC-4603-A589-7422A47A8E4A}"/>
+      <thm15:themeFamily xmlns="" xmlns:thm15="http://schemas.microsoft.com/office/thememl/2012/main" name="Office Theme" id="{62F939B6-93AF-4DB8-9C6B-D6C7DFDC589F}" vid="{4A3C46E8-61CC-4603-A589-7422A47A8E4A}"/>
     </a:ext>
   </a:extLst>
 </a:theme>

</xml_diff>

<commit_message>
updated bare bones project
</commit_message>
<xml_diff>
--- a/presentation.pptx
+++ b/presentation.pptx
@@ -258,7 +258,7 @@
           <a:p>
             <a:fld id="{1B94432C-314F-49E0-BCF5-1DF451204E4D}" type="datetimeFigureOut">
               <a:rPr lang="en-US" smtClean="0"/>
-              <a:t>6/18/15</a:t>
+              <a:t>6/26/15</a:t>
             </a:fld>
             <a:endParaRPr lang="en-US"/>
           </a:p>
@@ -423,7 +423,7 @@
           <a:p>
             <a:fld id="{4919CEFB-A65A-48DF-BB74-7C5EA2C86EF7}" type="datetimeFigureOut">
               <a:rPr lang="en-US" smtClean="0"/>
-              <a:t>6/18/15</a:t>
+              <a:t>6/26/15</a:t>
             </a:fld>
             <a:endParaRPr lang="en-US"/>
           </a:p>
@@ -765,7 +765,7 @@
           <a:effectLst/>
           <a:extLst>
             <a:ext uri="{91240B29-F687-4f45-9708-019B960494DF}">
-              <a14:hiddenLine xmlns:a14="http://schemas.microsoft.com/office/drawing/2010/main" xmlns="" w="9525">
+              <a14:hiddenLine xmlns="" xmlns:a14="http://schemas.microsoft.com/office/drawing/2010/main" w="9525">
                 <a:solidFill>
                   <a:srgbClr val="000000"/>
                 </a:solidFill>
@@ -2299,7 +2299,7 @@
           <a:ln/>
           <a:extLst>
             <a:ext uri="{91240B29-F687-4f45-9708-019B960494DF}">
-              <a14:hiddenLine xmlns:a14="http://schemas.microsoft.com/office/drawing/2010/main" xmlns="" w="9525">
+              <a14:hiddenLine xmlns="" xmlns:a14="http://schemas.microsoft.com/office/drawing/2010/main" w="9525">
                 <a:solidFill>
                   <a:srgbClr val="000000"/>
                 </a:solidFill>
@@ -2830,7 +2830,7 @@
           </a:ln>
           <a:extLst>
             <a:ext uri="{91240B29-F687-4f45-9708-019B960494DF}">
-              <a14:hiddenLine xmlns:a14="http://schemas.microsoft.com/office/drawing/2010/main" xmlns="" w="9525">
+              <a14:hiddenLine xmlns="" xmlns:a14="http://schemas.microsoft.com/office/drawing/2010/main" w="9525">
                 <a:solidFill>
                   <a:srgbClr val="000000"/>
                 </a:solidFill>
@@ -3124,7 +3124,7 @@
           </a:ln>
           <a:extLst>
             <a:ext uri="{91240B29-F687-4f45-9708-019B960494DF}">
-              <a14:hiddenLine xmlns:a14="http://schemas.microsoft.com/office/drawing/2010/main" xmlns="" w="9525">
+              <a14:hiddenLine xmlns="" xmlns:a14="http://schemas.microsoft.com/office/drawing/2010/main" w="9525">
                 <a:solidFill>
                   <a:srgbClr val="000000"/>
                 </a:solidFill>
@@ -3552,7 +3552,7 @@
           </a:ln>
           <a:extLst>
             <a:ext uri="{91240B29-F687-4f45-9708-019B960494DF}">
-              <a14:hiddenLine xmlns:a14="http://schemas.microsoft.com/office/drawing/2010/main" xmlns="" w="9525">
+              <a14:hiddenLine xmlns="" xmlns:a14="http://schemas.microsoft.com/office/drawing/2010/main" w="9525">
                 <a:solidFill>
                   <a:srgbClr val="000000"/>
                 </a:solidFill>
@@ -3958,7 +3958,7 @@
           <a:ln/>
           <a:extLst>
             <a:ext uri="{91240B29-F687-4f45-9708-019B960494DF}">
-              <a14:hiddenLine xmlns:a14="http://schemas.microsoft.com/office/drawing/2010/main" xmlns="" w="9525">
+              <a14:hiddenLine xmlns="" xmlns:a14="http://schemas.microsoft.com/office/drawing/2010/main" w="9525">
                 <a:solidFill>
                   <a:srgbClr val="000000"/>
                 </a:solidFill>
@@ -4983,10 +4983,18 @@
         </p:nvSpPr>
         <p:spPr/>
         <p:txBody>
-          <a:bodyPr/>
+          <a:bodyPr>
+            <a:normAutofit/>
+          </a:bodyPr>
           <a:lstStyle/>
           <a:p>
-            <a:endParaRPr lang="en-US"/>
+            <a:r>
+              <a:rPr lang="en-US" sz="3200" dirty="0" smtClean="0">
+                <a:hlinkClick r:id="rId2"/>
+              </a:rPr>
+              <a:t>github.com/andrewconnell/pres-sp15app-ng-spa</a:t>
+            </a:r>
+            <a:endParaRPr lang="en-US" sz="3200" dirty="0"/>
           </a:p>
         </p:txBody>
       </p:sp>
@@ -5108,7 +5116,7 @@
           <a:lstStyle/>
           <a:p>
             <a:r>
-              <a:rPr lang="en-US" dirty="0" smtClean="0"/>
+              <a:rPr lang="en-US" smtClean="0"/>
               <a:t>Server-Side ➡️ Client-Side Dev</a:t>
             </a:r>
             <a:endParaRPr lang="en-US" dirty="0"/>
@@ -5125,112 +5133,53 @@
             <p:ph idx="1"/>
           </p:nvPr>
         </p:nvSpPr>
-        <p:spPr>
-          <a:xfrm>
-            <a:off x="1981200" y="1676400"/>
-            <a:ext cx="8610600" cy="4419600"/>
-          </a:xfrm>
-        </p:spPr>
+        <p:spPr/>
         <p:txBody>
           <a:bodyPr/>
           <a:lstStyle/>
           <a:p>
             <a:r>
-              <a:rPr lang="en-US" dirty="0" err="1" smtClean="0"/>
+              <a:rPr lang="en-US" smtClean="0"/>
               <a:t>TypeScript</a:t>
             </a:r>
-            <a:endParaRPr lang="en-US" dirty="0" smtClean="0"/>
-          </a:p>
-          <a:p>
-            <a:r>
-              <a:rPr lang="en-US" dirty="0" smtClean="0"/>
+          </a:p>
+          <a:p>
+            <a:r>
+              <a:rPr lang="en-US" smtClean="0"/>
               <a:t>Good browser development tools</a:t>
             </a:r>
           </a:p>
           <a:p>
             <a:pPr lvl="1"/>
             <a:r>
-              <a:rPr lang="en-US" dirty="0" smtClean="0"/>
+              <a:rPr lang="en-US" smtClean="0"/>
               <a:t>Chrome Developer Tools</a:t>
             </a:r>
           </a:p>
           <a:p>
             <a:pPr lvl="1"/>
             <a:r>
-              <a:rPr lang="en-US" dirty="0" err="1" smtClean="0"/>
-              <a:t>Batarang</a:t>
-            </a:r>
-            <a:r>
-              <a:rPr lang="en-US" dirty="0" smtClean="0"/>
-              <a:t> - </a:t>
-            </a:r>
-            <a:r>
-              <a:rPr lang="en-US" sz="2400" dirty="0" err="1">
-                <a:solidFill>
-                  <a:srgbClr val="0070C0"/>
-                </a:solidFill>
-                <a:latin typeface="Segoe UI Semibold" charset="0"/>
-                <a:ea typeface="Segoe UI Semibold" charset="0"/>
-                <a:cs typeface="Segoe UI Semibold" charset="0"/>
-              </a:rPr>
-              <a:t>github.com</a:t>
-            </a:r>
-            <a:r>
-              <a:rPr lang="en-US" sz="2400" dirty="0">
-                <a:solidFill>
-                  <a:srgbClr val="0070C0"/>
-                </a:solidFill>
-                <a:latin typeface="Segoe UI Semibold" charset="0"/>
-                <a:ea typeface="Segoe UI Semibold" charset="0"/>
-                <a:cs typeface="Segoe UI Semibold" charset="0"/>
-              </a:rPr>
-              <a:t>/angular/</a:t>
-            </a:r>
-            <a:r>
-              <a:rPr lang="en-US" sz="2400" dirty="0" err="1">
-                <a:solidFill>
-                  <a:srgbClr val="0070C0"/>
-                </a:solidFill>
-                <a:latin typeface="Segoe UI Semibold" charset="0"/>
-                <a:ea typeface="Segoe UI Semibold" charset="0"/>
-                <a:cs typeface="Segoe UI Semibold" charset="0"/>
-              </a:rPr>
-              <a:t>angularjs-batarang</a:t>
-            </a:r>
-            <a:endParaRPr lang="en-US" dirty="0" smtClean="0">
-              <a:solidFill>
-                <a:srgbClr val="0070C0"/>
-              </a:solidFill>
-              <a:latin typeface="Segoe UI Semibold" charset="0"/>
-              <a:ea typeface="Segoe UI Semibold" charset="0"/>
-              <a:cs typeface="Segoe UI Semibold" charset="0"/>
-            </a:endParaRPr>
-          </a:p>
-          <a:p>
-            <a:r>
-              <a:rPr lang="en-US" dirty="0" smtClean="0"/>
+              <a:rPr lang="en-US" smtClean="0"/>
+              <a:t>Batarang - github.com/angular/angularjs-batarang</a:t>
+            </a:r>
+          </a:p>
+          <a:p>
+            <a:r>
+              <a:rPr lang="en-US" smtClean="0"/>
               <a:t>Fiddler</a:t>
             </a:r>
           </a:p>
           <a:p>
             <a:r>
-              <a:rPr lang="en-US" dirty="0" smtClean="0"/>
+              <a:rPr lang="en-US" smtClean="0"/>
               <a:t>Breeze</a:t>
             </a:r>
           </a:p>
           <a:p>
             <a:pPr lvl="1"/>
             <a:r>
-              <a:rPr lang="en-US" dirty="0" smtClean="0"/>
-              <a:t>Think “</a:t>
-            </a:r>
-            <a:r>
-              <a:rPr lang="en-US" i="1" dirty="0" smtClean="0"/>
-              <a:t>Entity Framework in JavaScript</a:t>
-            </a:r>
-            <a:r>
-              <a:rPr lang="en-US" dirty="0" smtClean="0"/>
-              <a:t>”</a:t>
+              <a:rPr lang="en-US" smtClean="0"/>
+              <a:t>Think “Entity Framework in JavaScript”</a:t>
             </a:r>
             <a:endParaRPr lang="en-US" dirty="0"/>
           </a:p>
@@ -5457,7 +5406,7 @@
         <p:spPr/>
         <p:txBody>
           <a:bodyPr>
-            <a:normAutofit fontScale="92500" lnSpcReduction="10000"/>
+            <a:normAutofit/>
           </a:bodyPr>
           <a:lstStyle/>
           <a:p>
@@ -5470,15 +5419,17 @@
             <a:pPr lvl="1"/>
             <a:r>
               <a:rPr lang="en-US" dirty="0" smtClean="0"/>
-              <a:t>1.3 – current release</a:t>
-            </a:r>
-          </a:p>
-          <a:p>
-            <a:pPr lvl="1"/>
+              <a:t>1.4 </a:t>
+            </a:r>
             <a:r>
               <a:rPr lang="en-US" dirty="0" smtClean="0"/>
-              <a:t>1.4 – currently in beta</a:t>
-            </a:r>
+              <a:t>– currently </a:t>
+            </a:r>
+            <a:r>
+              <a:rPr lang="en-US" dirty="0" smtClean="0"/>
+              <a:t>release</a:t>
+            </a:r>
+            <a:endParaRPr lang="en-US" dirty="0" smtClean="0"/>
           </a:p>
           <a:p>
             <a:pPr lvl="1"/>
@@ -5779,33 +5730,41 @@
         <p:spPr>
           <a:xfrm>
             <a:off x="1357088" y="4814603"/>
-            <a:ext cx="6770911" cy="603168"/>
+            <a:ext cx="8553031" cy="603168"/>
           </a:xfrm>
         </p:spPr>
         <p:txBody>
           <a:bodyPr>
-            <a:normAutofit fontScale="92500"/>
+            <a:normAutofit/>
           </a:bodyPr>
           <a:lstStyle/>
           <a:p>
             <a:pPr algn="ctr"/>
             <a:r>
-              <a:rPr lang="en-US" dirty="0" err="1"/>
+              <a:rPr lang="en-US" b="1" dirty="0" err="1">
+                <a:hlinkClick r:id="rId2"/>
+              </a:rPr>
               <a:t>github.com</a:t>
             </a:r>
             <a:r>
-              <a:rPr lang="en-US" dirty="0"/>
+              <a:rPr lang="en-US" b="1" dirty="0">
+                <a:hlinkClick r:id="rId2"/>
+              </a:rPr>
               <a:t>/</a:t>
             </a:r>
             <a:r>
-              <a:rPr lang="en-US" dirty="0" err="1"/>
+              <a:rPr lang="en-US" b="1" dirty="0" err="1">
+                <a:hlinkClick r:id="rId2"/>
+              </a:rPr>
               <a:t>andrewconnell</a:t>
             </a:r>
             <a:r>
-              <a:rPr lang="en-US" dirty="0"/>
+              <a:rPr lang="en-US" b="1" dirty="0">
+                <a:hlinkClick r:id="rId2"/>
+              </a:rPr>
               <a:t>/pres-sp15app-ng-spa</a:t>
             </a:r>
-            <a:endParaRPr lang="en-US" dirty="0"/>
+            <a:endParaRPr lang="en-US" b="1" dirty="0"/>
           </a:p>
         </p:txBody>
       </p:sp>
@@ -5818,7 +5777,7 @@
           <p:nvPr/>
         </p:nvPicPr>
         <p:blipFill>
-          <a:blip r:embed="rId2">
+          <a:blip r:embed="rId3">
             <a:extLst>
               <a:ext uri="{28A0092B-C50C-407E-A947-70E740481C1C}">
                 <a14:useLocalDpi xmlns:a14="http://schemas.microsoft.com/office/drawing/2010/main" val="0"/>
@@ -7377,7 +7336,7 @@
           <a:lstStyle/>
           <a:p>
             <a:r>
-              <a:rPr lang="en-US" dirty="0" smtClean="0"/>
+              <a:rPr lang="en-US" smtClean="0"/>
               <a:t>Apps in Present Day SharePoint</a:t>
             </a:r>
             <a:endParaRPr lang="en-US" dirty="0"/>
@@ -7394,60 +7353,45 @@
             <p:ph idx="1"/>
           </p:nvPr>
         </p:nvSpPr>
-        <p:spPr>
-          <a:xfrm>
-            <a:off x="1981200" y="1676400"/>
-            <a:ext cx="8305800" cy="4419600"/>
-          </a:xfrm>
-        </p:spPr>
+        <p:spPr/>
         <p:txBody>
-          <a:bodyPr>
-            <a:normAutofit lnSpcReduction="10000"/>
-          </a:bodyPr>
+          <a:bodyPr/>
           <a:lstStyle/>
           <a:p>
             <a:r>
-              <a:rPr lang="en-US" dirty="0" smtClean="0"/>
+              <a:rPr lang="en-US" smtClean="0"/>
               <a:t>Cloud hosted apps must live somewhere</a:t>
             </a:r>
           </a:p>
           <a:p>
             <a:pPr lvl="1"/>
             <a:r>
-              <a:rPr lang="en-US" dirty="0" smtClean="0"/>
-              <a:t>Cloud? Azure, AWS, Google, </a:t>
-            </a:r>
-            <a:r>
-              <a:rPr lang="en-US" dirty="0" err="1" smtClean="0"/>
-              <a:t>etc</a:t>
-            </a:r>
-            <a:r>
-              <a:rPr lang="en-US" dirty="0" smtClean="0"/>
-              <a:t>?</a:t>
+              <a:rPr lang="en-US" smtClean="0"/>
+              <a:t>Cloud? Azure, AWS, Google, etc?</a:t>
             </a:r>
           </a:p>
           <a:p>
             <a:pPr lvl="1"/>
             <a:r>
-              <a:rPr lang="en-US" dirty="0" smtClean="0"/>
+              <a:rPr lang="en-US" smtClean="0"/>
               <a:t>On-Premises servers</a:t>
             </a:r>
           </a:p>
           <a:p>
-            <a:endParaRPr lang="en-US" dirty="0" smtClean="0"/>
-          </a:p>
-          <a:p>
-            <a:r>
-              <a:rPr lang="en-US" dirty="0" smtClean="0"/>
+            <a:endParaRPr lang="en-US" smtClean="0"/>
+          </a:p>
+          <a:p>
+            <a:r>
+              <a:rPr lang="en-US" smtClean="0"/>
               <a:t>SharePoint hosted apps use cookie-based authentication (not token based)</a:t>
             </a:r>
           </a:p>
           <a:p>
-            <a:endParaRPr lang="en-US" dirty="0" smtClean="0"/>
-          </a:p>
-          <a:p>
-            <a:r>
-              <a:rPr lang="en-US" dirty="0" smtClean="0"/>
+            <a:endParaRPr lang="en-US" smtClean="0"/>
+          </a:p>
+          <a:p>
+            <a:r>
+              <a:rPr lang="en-US" smtClean="0"/>
               <a:t>Generally tied to Visual Studio-based projects</a:t>
             </a:r>
             <a:endParaRPr lang="en-US" dirty="0"/>

</xml_diff>